<commit_message>
content: featured and post image updated
</commit_message>
<xml_diff>
--- a/templates/PostImage.pptx
+++ b/templates/PostImage.pptx
@@ -254,7 +254,7 @@
           <a:p>
             <a:fld id="{A7B99496-28B4-4F48-9C90-51DE3F753911}" type="datetimeFigureOut">
               <a:rPr lang="en-US" smtClean="0"/>
-              <a:t>11/29/25</a:t>
+              <a:t>12/3/25</a:t>
             </a:fld>
             <a:endParaRPr lang="en-US"/>
           </a:p>
@@ -427,7 +427,7 @@
           <a:p>
             <a:fld id="{A7B99496-28B4-4F48-9C90-51DE3F753911}" type="datetimeFigureOut">
               <a:rPr lang="en-US" smtClean="0"/>
-              <a:t>11/29/25</a:t>
+              <a:t>12/3/25</a:t>
             </a:fld>
             <a:endParaRPr lang="en-US"/>
           </a:p>
@@ -610,7 +610,7 @@
           <a:p>
             <a:fld id="{A7B99496-28B4-4F48-9C90-51DE3F753911}" type="datetimeFigureOut">
               <a:rPr lang="en-US" smtClean="0"/>
-              <a:t>11/29/25</a:t>
+              <a:t>12/3/25</a:t>
             </a:fld>
             <a:endParaRPr lang="en-US"/>
           </a:p>
@@ -783,7 +783,7 @@
           <a:p>
             <a:fld id="{A7B99496-28B4-4F48-9C90-51DE3F753911}" type="datetimeFigureOut">
               <a:rPr lang="en-US" smtClean="0"/>
-              <a:t>11/29/25</a:t>
+              <a:t>12/3/25</a:t>
             </a:fld>
             <a:endParaRPr lang="en-US"/>
           </a:p>
@@ -1032,7 +1032,7 @@
           <a:p>
             <a:fld id="{A7B99496-28B4-4F48-9C90-51DE3F753911}" type="datetimeFigureOut">
               <a:rPr lang="en-US" smtClean="0"/>
-              <a:t>11/29/25</a:t>
+              <a:t>12/3/25</a:t>
             </a:fld>
             <a:endParaRPr lang="en-US"/>
           </a:p>
@@ -1267,7 +1267,7 @@
           <a:p>
             <a:fld id="{A7B99496-28B4-4F48-9C90-51DE3F753911}" type="datetimeFigureOut">
               <a:rPr lang="en-US" smtClean="0"/>
-              <a:t>11/29/25</a:t>
+              <a:t>12/3/25</a:t>
             </a:fld>
             <a:endParaRPr lang="en-US"/>
           </a:p>
@@ -1637,7 +1637,7 @@
           <a:p>
             <a:fld id="{A7B99496-28B4-4F48-9C90-51DE3F753911}" type="datetimeFigureOut">
               <a:rPr lang="en-US" smtClean="0"/>
-              <a:t>11/29/25</a:t>
+              <a:t>12/3/25</a:t>
             </a:fld>
             <a:endParaRPr lang="en-US"/>
           </a:p>
@@ -1758,7 +1758,7 @@
           <a:p>
             <a:fld id="{A7B99496-28B4-4F48-9C90-51DE3F753911}" type="datetimeFigureOut">
               <a:rPr lang="en-US" smtClean="0"/>
-              <a:t>11/29/25</a:t>
+              <a:t>12/3/25</a:t>
             </a:fld>
             <a:endParaRPr lang="en-US"/>
           </a:p>
@@ -1856,7 +1856,7 @@
           <a:p>
             <a:fld id="{A7B99496-28B4-4F48-9C90-51DE3F753911}" type="datetimeFigureOut">
               <a:rPr lang="en-US" smtClean="0"/>
-              <a:t>11/29/25</a:t>
+              <a:t>12/3/25</a:t>
             </a:fld>
             <a:endParaRPr lang="en-US"/>
           </a:p>
@@ -2136,7 +2136,7 @@
           <a:p>
             <a:fld id="{A7B99496-28B4-4F48-9C90-51DE3F753911}" type="datetimeFigureOut">
               <a:rPr lang="en-US" smtClean="0"/>
-              <a:t>11/29/25</a:t>
+              <a:t>12/3/25</a:t>
             </a:fld>
             <a:endParaRPr lang="en-US"/>
           </a:p>
@@ -2396,7 +2396,7 @@
           <a:p>
             <a:fld id="{A7B99496-28B4-4F48-9C90-51DE3F753911}" type="datetimeFigureOut">
               <a:rPr lang="en-US" smtClean="0"/>
-              <a:t>11/29/25</a:t>
+              <a:t>12/3/25</a:t>
             </a:fld>
             <a:endParaRPr lang="en-US"/>
           </a:p>
@@ -2612,7 +2612,7 @@
           <a:p>
             <a:fld id="{A7B99496-28B4-4F48-9C90-51DE3F753911}" type="datetimeFigureOut">
               <a:rPr lang="en-US" smtClean="0"/>
-              <a:t>11/29/25</a:t>
+              <a:t>12/3/25</a:t>
             </a:fld>
             <a:endParaRPr lang="en-US"/>
           </a:p>
@@ -3010,23 +3010,17 @@
       <p:bgPr>
         <a:gradFill flip="none" rotWithShape="1">
           <a:gsLst>
-            <a:gs pos="68000">
+            <a:gs pos="67000">
+              <a:srgbClr val="009193"/>
+            </a:gs>
+            <a:gs pos="32000">
               <a:srgbClr val="80C8C9"/>
             </a:gs>
-            <a:gs pos="100000">
-              <a:srgbClr val="009193"/>
-            </a:gs>
-            <a:gs pos="35000">
-              <a:schemeClr val="accent2">
-                <a:lumMod val="0"/>
-                <a:lumOff val="100000"/>
-              </a:schemeClr>
-            </a:gs>
           </a:gsLst>
-          <a:path path="rect">
-            <a:fillToRect t="100000" r="100000"/>
+          <a:path path="circle">
+            <a:fillToRect l="100000" t="100000"/>
           </a:path>
-          <a:tileRect l="-100000" b="-100000"/>
+          <a:tileRect r="-100000" b="-100000"/>
         </a:gradFill>
         <a:effectLst/>
       </p:bgPr>
@@ -3063,8 +3057,8 @@
         </p:nvSpPr>
         <p:spPr>
           <a:xfrm>
-            <a:off x="1010370" y="2088456"/>
-            <a:ext cx="9704901" cy="1604991"/>
+            <a:off x="839593" y="2619833"/>
+            <a:ext cx="10512814" cy="1604991"/>
           </a:xfrm>
           <a:noFill/>
         </p:spPr>
@@ -3076,19 +3070,28 @@
           <a:p>
             <a:r>
               <a:rPr lang="en-US" sz="5400" b="1" dirty="0">
+                <a:solidFill>
+                  <a:schemeClr val="bg1"/>
+                </a:solidFill>
                 <a:latin typeface="Avenir Book" panose="02000503020000020003" pitchFamily="2" charset="0"/>
                 <a:cs typeface="Al Nile" pitchFamily="2" charset="-78"/>
               </a:rPr>
-              <a:t>Cache Augmented Generation</a:t>
+              <a:t>&gt;_Cache Augmented Generation</a:t>
             </a:r>
             <a:br>
               <a:rPr lang="en-US" sz="5400" b="1" dirty="0">
+                <a:solidFill>
+                  <a:schemeClr val="bg1"/>
+                </a:solidFill>
                 <a:latin typeface="Avenir Book" panose="02000503020000020003" pitchFamily="2" charset="0"/>
                 <a:cs typeface="Al Nile" pitchFamily="2" charset="-78"/>
               </a:rPr>
             </a:br>
             <a:r>
               <a:rPr lang="en-US" sz="5400" b="1" dirty="0">
+                <a:solidFill>
+                  <a:schemeClr val="bg1"/>
+                </a:solidFill>
                 <a:latin typeface="Avenir Book" panose="02000503020000020003" pitchFamily="2" charset="0"/>
                 <a:cs typeface="Al Nile" pitchFamily="2" charset="-78"/>
               </a:rPr>
@@ -3113,7 +3116,7 @@
         </p:nvSpPr>
         <p:spPr>
           <a:xfrm>
-            <a:off x="1010370" y="5263376"/>
+            <a:off x="1010369" y="5086748"/>
             <a:ext cx="10171259" cy="679828"/>
           </a:xfrm>
           <a:prstGeom prst="rect">
@@ -3145,14 +3148,20 @@
           </a:lstStyle>
           <a:p>
             <a:r>
-              <a:rPr lang="en-US" sz="3600" b="1" dirty="0">
+              <a:rPr lang="en-US" sz="2800" b="1" dirty="0">
+                <a:solidFill>
+                  <a:srgbClr val="085758"/>
+                </a:solidFill>
                 <a:latin typeface="Avenir Book" panose="02000503020000020003" pitchFamily="2" charset="0"/>
                 <a:cs typeface="Al Nile" pitchFamily="2" charset="-78"/>
               </a:rPr>
               <a:t>Applied</a:t>
             </a:r>
             <a:r>
-              <a:rPr lang="en-US" sz="3200" b="1" dirty="0">
+              <a:rPr lang="en-US" sz="2400" b="1" dirty="0">
+                <a:solidFill>
+                  <a:srgbClr val="085758"/>
+                </a:solidFill>
                 <a:latin typeface="Avenir Book" panose="02000503020000020003" pitchFamily="2" charset="0"/>
                 <a:cs typeface="Al Nile" pitchFamily="2" charset="-78"/>
               </a:rPr>
@@ -3177,7 +3186,7 @@
         </p:nvSpPr>
         <p:spPr>
           <a:xfrm>
-            <a:off x="1010370" y="545126"/>
+            <a:off x="1010370" y="1078081"/>
             <a:ext cx="10171259" cy="679828"/>
           </a:xfrm>
           <a:prstGeom prst="rect">
@@ -3210,6 +3219,9 @@
           <a:p>
             <a:r>
               <a:rPr lang="en-US" sz="2000" b="1" dirty="0">
+                <a:solidFill>
+                  <a:srgbClr val="084C4D"/>
+                </a:solidFill>
                 <a:latin typeface="Avenir Book" panose="02000503020000020003" pitchFamily="2" charset="0"/>
                 <a:cs typeface="Al Nile" pitchFamily="2" charset="-78"/>
               </a:rPr>

</xml_diff>